<commit_message>
Adicionando demais notebooks para demais cenários
</commit_message>
<xml_diff>
--- a/disciplinas/fuzzy/john-trabalho-final.pptx
+++ b/disciplinas/fuzzy/john-trabalho-final.pptx
@@ -5,7 +5,7 @@
     <p:sldMasterId id="2147483660" r:id="rId1"/>
   </p:sldMasterIdLst>
   <p:notesMasterIdLst>
-    <p:notesMasterId r:id="rId9"/>
+    <p:notesMasterId r:id="rId18"/>
   </p:notesMasterIdLst>
   <p:sldIdLst>
     <p:sldId id="256" r:id="rId2"/>
@@ -15,6 +15,15 @@
     <p:sldId id="260" r:id="rId6"/>
     <p:sldId id="261" r:id="rId7"/>
     <p:sldId id="262" r:id="rId8"/>
+    <p:sldId id="263" r:id="rId9"/>
+    <p:sldId id="264" r:id="rId10"/>
+    <p:sldId id="265" r:id="rId11"/>
+    <p:sldId id="266" r:id="rId12"/>
+    <p:sldId id="267" r:id="rId13"/>
+    <p:sldId id="268" r:id="rId14"/>
+    <p:sldId id="269" r:id="rId15"/>
+    <p:sldId id="270" r:id="rId16"/>
+    <p:sldId id="271" r:id="rId17"/>
   </p:sldIdLst>
   <p:sldSz cx="9144000" cy="6858000" type="screen4x3"/>
   <p:notesSz cx="6858000" cy="9144000"/>
@@ -1403,14 +1412,35 @@
         </dgm:presLayoutVars>
       </dgm:prSet>
       <dgm:spPr/>
+      <dgm:t>
+        <a:bodyPr/>
+        <a:lstStyle/>
+        <a:p>
+          <a:endParaRPr lang="en-US"/>
+        </a:p>
+      </dgm:t>
     </dgm:pt>
     <dgm:pt modelId="{192C57F4-BE5A-7C4C-848A-DD5C92C4E7F7}" type="pres">
       <dgm:prSet presAssocID="{2298196B-8AE4-254F-AD53-31C9AD9A1264}" presName="sibTrans" presStyleLbl="sibTrans2D1" presStyleIdx="0" presStyleCnt="4"/>
       <dgm:spPr/>
+      <dgm:t>
+        <a:bodyPr/>
+        <a:lstStyle/>
+        <a:p>
+          <a:endParaRPr lang="en-US"/>
+        </a:p>
+      </dgm:t>
     </dgm:pt>
     <dgm:pt modelId="{67BCB111-C0EB-DC49-9B1D-0BA09630885E}" type="pres">
       <dgm:prSet presAssocID="{2298196B-8AE4-254F-AD53-31C9AD9A1264}" presName="connectorText" presStyleLbl="sibTrans2D1" presStyleIdx="0" presStyleCnt="4"/>
       <dgm:spPr/>
+      <dgm:t>
+        <a:bodyPr/>
+        <a:lstStyle/>
+        <a:p>
+          <a:endParaRPr lang="en-US"/>
+        </a:p>
+      </dgm:t>
     </dgm:pt>
     <dgm:pt modelId="{55F2D839-A9DA-5B42-9FF5-156747F49F4D}" type="pres">
       <dgm:prSet presAssocID="{6248A5C6-5978-AE4C-8C31-9A55C671BB49}" presName="node" presStyleLbl="node1" presStyleIdx="1" presStyleCnt="5">
@@ -1419,14 +1449,35 @@
         </dgm:presLayoutVars>
       </dgm:prSet>
       <dgm:spPr/>
+      <dgm:t>
+        <a:bodyPr/>
+        <a:lstStyle/>
+        <a:p>
+          <a:endParaRPr lang="en-US"/>
+        </a:p>
+      </dgm:t>
     </dgm:pt>
     <dgm:pt modelId="{37E2712F-E6A6-BC41-9A2B-F8EF1CE3F485}" type="pres">
       <dgm:prSet presAssocID="{93B6A063-AF74-664D-AC1C-E9EB84576E5F}" presName="sibTrans" presStyleLbl="sibTrans2D1" presStyleIdx="1" presStyleCnt="4"/>
       <dgm:spPr/>
+      <dgm:t>
+        <a:bodyPr/>
+        <a:lstStyle/>
+        <a:p>
+          <a:endParaRPr lang="en-US"/>
+        </a:p>
+      </dgm:t>
     </dgm:pt>
     <dgm:pt modelId="{C882C445-45AB-5846-9DE7-92EECAE1551B}" type="pres">
       <dgm:prSet presAssocID="{93B6A063-AF74-664D-AC1C-E9EB84576E5F}" presName="connectorText" presStyleLbl="sibTrans2D1" presStyleIdx="1" presStyleCnt="4"/>
       <dgm:spPr/>
+      <dgm:t>
+        <a:bodyPr/>
+        <a:lstStyle/>
+        <a:p>
+          <a:endParaRPr lang="en-US"/>
+        </a:p>
+      </dgm:t>
     </dgm:pt>
     <dgm:pt modelId="{6BF343B4-FB55-A54A-B361-01FD3D11F415}" type="pres">
       <dgm:prSet presAssocID="{DD8E3127-28D4-314E-903E-AFB08B3D104B}" presName="node" presStyleLbl="node1" presStyleIdx="2" presStyleCnt="5">
@@ -1435,14 +1486,35 @@
         </dgm:presLayoutVars>
       </dgm:prSet>
       <dgm:spPr/>
+      <dgm:t>
+        <a:bodyPr/>
+        <a:lstStyle/>
+        <a:p>
+          <a:endParaRPr lang="en-US"/>
+        </a:p>
+      </dgm:t>
     </dgm:pt>
     <dgm:pt modelId="{14A79965-6670-E24B-B8CF-AEC70162687E}" type="pres">
       <dgm:prSet presAssocID="{C8DED58F-81C1-3C43-8A70-14E7FFFF44B4}" presName="sibTrans" presStyleLbl="sibTrans2D1" presStyleIdx="2" presStyleCnt="4"/>
       <dgm:spPr/>
+      <dgm:t>
+        <a:bodyPr/>
+        <a:lstStyle/>
+        <a:p>
+          <a:endParaRPr lang="en-US"/>
+        </a:p>
+      </dgm:t>
     </dgm:pt>
     <dgm:pt modelId="{5681FF65-3584-1E4F-87BE-73EAF167A444}" type="pres">
       <dgm:prSet presAssocID="{C8DED58F-81C1-3C43-8A70-14E7FFFF44B4}" presName="connectorText" presStyleLbl="sibTrans2D1" presStyleIdx="2" presStyleCnt="4"/>
       <dgm:spPr/>
+      <dgm:t>
+        <a:bodyPr/>
+        <a:lstStyle/>
+        <a:p>
+          <a:endParaRPr lang="en-US"/>
+        </a:p>
+      </dgm:t>
     </dgm:pt>
     <dgm:pt modelId="{6A05199F-04D9-5741-855C-82AC31EA6CD2}" type="pres">
       <dgm:prSet presAssocID="{FBAFFB47-96A3-A142-B384-60E9007B8B60}" presName="node" presStyleLbl="node1" presStyleIdx="3" presStyleCnt="5">
@@ -1451,14 +1523,35 @@
         </dgm:presLayoutVars>
       </dgm:prSet>
       <dgm:spPr/>
+      <dgm:t>
+        <a:bodyPr/>
+        <a:lstStyle/>
+        <a:p>
+          <a:endParaRPr lang="en-US"/>
+        </a:p>
+      </dgm:t>
     </dgm:pt>
     <dgm:pt modelId="{2842B14E-DEFA-F642-8F28-EE7B257635E1}" type="pres">
       <dgm:prSet presAssocID="{237EA267-F0D2-7C4A-98D5-5B9A93060687}" presName="sibTrans" presStyleLbl="sibTrans2D1" presStyleIdx="3" presStyleCnt="4"/>
       <dgm:spPr/>
+      <dgm:t>
+        <a:bodyPr/>
+        <a:lstStyle/>
+        <a:p>
+          <a:endParaRPr lang="en-US"/>
+        </a:p>
+      </dgm:t>
     </dgm:pt>
     <dgm:pt modelId="{D82149D3-DCE1-6048-92F3-B68BEF2F4DC8}" type="pres">
       <dgm:prSet presAssocID="{237EA267-F0D2-7C4A-98D5-5B9A93060687}" presName="connectorText" presStyleLbl="sibTrans2D1" presStyleIdx="3" presStyleCnt="4"/>
       <dgm:spPr/>
+      <dgm:t>
+        <a:bodyPr/>
+        <a:lstStyle/>
+        <a:p>
+          <a:endParaRPr lang="en-US"/>
+        </a:p>
+      </dgm:t>
     </dgm:pt>
     <dgm:pt modelId="{F2FC5465-A93F-AE48-9FD7-1B4F1D1C58B6}" type="pres">
       <dgm:prSet presAssocID="{13D22A8E-BB3E-794F-AA9B-EB43C7284367}" presName="node" presStyleLbl="node1" presStyleIdx="4" presStyleCnt="5">
@@ -1467,28 +1560,35 @@
         </dgm:presLayoutVars>
       </dgm:prSet>
       <dgm:spPr/>
+      <dgm:t>
+        <a:bodyPr/>
+        <a:lstStyle/>
+        <a:p>
+          <a:endParaRPr lang="en-US"/>
+        </a:p>
+      </dgm:t>
     </dgm:pt>
   </dgm:ptLst>
   <dgm:cxnLst>
+    <dgm:cxn modelId="{633FD542-7404-A549-AA02-ADAAF48A4076}" type="presOf" srcId="{27832FA6-9C94-2A41-895B-C4EAA56D2F59}" destId="{43A4F83B-A2AD-7A47-8114-082A5FCEC3F3}" srcOrd="0" destOrd="0" presId="urn:microsoft.com/office/officeart/2005/8/layout/process2"/>
     <dgm:cxn modelId="{11755EA1-0A84-944B-AA48-4C6CCD405D43}" srcId="{0DCB4A18-FB49-9845-AA38-8E241C57671C}" destId="{DD8E3127-28D4-314E-903E-AFB08B3D104B}" srcOrd="2" destOrd="0" parTransId="{9A4BB21C-36FA-BB47-9743-06470C17739D}" sibTransId="{C8DED58F-81C1-3C43-8A70-14E7FFFF44B4}"/>
+    <dgm:cxn modelId="{1F3C400C-390A-7342-8732-AB1B8F297DAD}" type="presOf" srcId="{2298196B-8AE4-254F-AD53-31C9AD9A1264}" destId="{192C57F4-BE5A-7C4C-848A-DD5C92C4E7F7}" srcOrd="0" destOrd="0" presId="urn:microsoft.com/office/officeart/2005/8/layout/process2"/>
+    <dgm:cxn modelId="{422E965C-7E4D-2F4A-988B-6DCA0709418F}" type="presOf" srcId="{0DCB4A18-FB49-9845-AA38-8E241C57671C}" destId="{2ABE82A2-941C-4646-B126-163D275D3D67}" srcOrd="0" destOrd="0" presId="urn:microsoft.com/office/officeart/2005/8/layout/process2"/>
+    <dgm:cxn modelId="{6AF6BACE-904C-E842-945F-EFB5D724C4DC}" type="presOf" srcId="{93B6A063-AF74-664D-AC1C-E9EB84576E5F}" destId="{C882C445-45AB-5846-9DE7-92EECAE1551B}" srcOrd="1" destOrd="0" presId="urn:microsoft.com/office/officeart/2005/8/layout/process2"/>
+    <dgm:cxn modelId="{412641AA-B1EC-9F4F-A50B-C32527B519F5}" srcId="{0DCB4A18-FB49-9845-AA38-8E241C57671C}" destId="{27832FA6-9C94-2A41-895B-C4EAA56D2F59}" srcOrd="0" destOrd="0" parTransId="{E825196A-8E68-3B48-871C-2DD71BDEE57E}" sibTransId="{2298196B-8AE4-254F-AD53-31C9AD9A1264}"/>
+    <dgm:cxn modelId="{4E5D93AF-750B-CE4F-879F-463125461F3E}" type="presOf" srcId="{237EA267-F0D2-7C4A-98D5-5B9A93060687}" destId="{D82149D3-DCE1-6048-92F3-B68BEF2F4DC8}" srcOrd="1" destOrd="0" presId="urn:microsoft.com/office/officeart/2005/8/layout/process2"/>
+    <dgm:cxn modelId="{38A0C3AC-D7FA-C34D-BC57-7F76CF4FCB00}" type="presOf" srcId="{C8DED58F-81C1-3C43-8A70-14E7FFFF44B4}" destId="{14A79965-6670-E24B-B8CF-AEC70162687E}" srcOrd="0" destOrd="0" presId="urn:microsoft.com/office/officeart/2005/8/layout/process2"/>
+    <dgm:cxn modelId="{9F30650C-D9D0-694D-B3D0-F47408DC751E}" srcId="{0DCB4A18-FB49-9845-AA38-8E241C57671C}" destId="{13D22A8E-BB3E-794F-AA9B-EB43C7284367}" srcOrd="4" destOrd="0" parTransId="{6697F7B9-55CC-1449-B5A1-40497B2E9BD8}" sibTransId="{7252E13C-4256-4D43-875E-45BBE6AD3FB1}"/>
+    <dgm:cxn modelId="{3FCFDEE4-D1E7-E144-B7D7-40450A19E17E}" type="presOf" srcId="{C8DED58F-81C1-3C43-8A70-14E7FFFF44B4}" destId="{5681FF65-3584-1E4F-87BE-73EAF167A444}" srcOrd="1" destOrd="0" presId="urn:microsoft.com/office/officeart/2005/8/layout/process2"/>
+    <dgm:cxn modelId="{9A9B9141-0262-A34F-9B13-C4F30CBC78C6}" srcId="{0DCB4A18-FB49-9845-AA38-8E241C57671C}" destId="{FBAFFB47-96A3-A142-B384-60E9007B8B60}" srcOrd="3" destOrd="0" parTransId="{C40CB96F-A5DA-004F-8BBA-07E9C7E3FCFD}" sibTransId="{237EA267-F0D2-7C4A-98D5-5B9A93060687}"/>
+    <dgm:cxn modelId="{A0008A21-39FD-1747-9F02-BEB0AEE5AD48}" type="presOf" srcId="{13D22A8E-BB3E-794F-AA9B-EB43C7284367}" destId="{F2FC5465-A93F-AE48-9FD7-1B4F1D1C58B6}" srcOrd="0" destOrd="0" presId="urn:microsoft.com/office/officeart/2005/8/layout/process2"/>
+    <dgm:cxn modelId="{DB220F54-6375-5148-A65E-C3DA545B8D25}" type="presOf" srcId="{237EA267-F0D2-7C4A-98D5-5B9A93060687}" destId="{2842B14E-DEFA-F642-8F28-EE7B257635E1}" srcOrd="0" destOrd="0" presId="urn:microsoft.com/office/officeart/2005/8/layout/process2"/>
+    <dgm:cxn modelId="{41A9A3CA-9759-B945-A87B-8B7B9E60D03E}" type="presOf" srcId="{FBAFFB47-96A3-A142-B384-60E9007B8B60}" destId="{6A05199F-04D9-5741-855C-82AC31EA6CD2}" srcOrd="0" destOrd="0" presId="urn:microsoft.com/office/officeart/2005/8/layout/process2"/>
     <dgm:cxn modelId="{1EA2EEBD-D3F7-504E-BC64-2770B7432555}" type="presOf" srcId="{2298196B-8AE4-254F-AD53-31C9AD9A1264}" destId="{67BCB111-C0EB-DC49-9B1D-0BA09630885E}" srcOrd="1" destOrd="0" presId="urn:microsoft.com/office/officeart/2005/8/layout/process2"/>
-    <dgm:cxn modelId="{412641AA-B1EC-9F4F-A50B-C32527B519F5}" srcId="{0DCB4A18-FB49-9845-AA38-8E241C57671C}" destId="{27832FA6-9C94-2A41-895B-C4EAA56D2F59}" srcOrd="0" destOrd="0" parTransId="{E825196A-8E68-3B48-871C-2DD71BDEE57E}" sibTransId="{2298196B-8AE4-254F-AD53-31C9AD9A1264}"/>
-    <dgm:cxn modelId="{9A9B9141-0262-A34F-9B13-C4F30CBC78C6}" srcId="{0DCB4A18-FB49-9845-AA38-8E241C57671C}" destId="{FBAFFB47-96A3-A142-B384-60E9007B8B60}" srcOrd="3" destOrd="0" parTransId="{C40CB96F-A5DA-004F-8BBA-07E9C7E3FCFD}" sibTransId="{237EA267-F0D2-7C4A-98D5-5B9A93060687}"/>
-    <dgm:cxn modelId="{6AF6BACE-904C-E842-945F-EFB5D724C4DC}" type="presOf" srcId="{93B6A063-AF74-664D-AC1C-E9EB84576E5F}" destId="{C882C445-45AB-5846-9DE7-92EECAE1551B}" srcOrd="1" destOrd="0" presId="urn:microsoft.com/office/officeart/2005/8/layout/process2"/>
-    <dgm:cxn modelId="{41A9A3CA-9759-B945-A87B-8B7B9E60D03E}" type="presOf" srcId="{FBAFFB47-96A3-A142-B384-60E9007B8B60}" destId="{6A05199F-04D9-5741-855C-82AC31EA6CD2}" srcOrd="0" destOrd="0" presId="urn:microsoft.com/office/officeart/2005/8/layout/process2"/>
-    <dgm:cxn modelId="{38A0C3AC-D7FA-C34D-BC57-7F76CF4FCB00}" type="presOf" srcId="{C8DED58F-81C1-3C43-8A70-14E7FFFF44B4}" destId="{14A79965-6670-E24B-B8CF-AEC70162687E}" srcOrd="0" destOrd="0" presId="urn:microsoft.com/office/officeart/2005/8/layout/process2"/>
-    <dgm:cxn modelId="{3FCFDEE4-D1E7-E144-B7D7-40450A19E17E}" type="presOf" srcId="{C8DED58F-81C1-3C43-8A70-14E7FFFF44B4}" destId="{5681FF65-3584-1E4F-87BE-73EAF167A444}" srcOrd="1" destOrd="0" presId="urn:microsoft.com/office/officeart/2005/8/layout/process2"/>
-    <dgm:cxn modelId="{9F30650C-D9D0-694D-B3D0-F47408DC751E}" srcId="{0DCB4A18-FB49-9845-AA38-8E241C57671C}" destId="{13D22A8E-BB3E-794F-AA9B-EB43C7284367}" srcOrd="4" destOrd="0" parTransId="{6697F7B9-55CC-1449-B5A1-40497B2E9BD8}" sibTransId="{7252E13C-4256-4D43-875E-45BBE6AD3FB1}"/>
-    <dgm:cxn modelId="{A0008A21-39FD-1747-9F02-BEB0AEE5AD48}" type="presOf" srcId="{13D22A8E-BB3E-794F-AA9B-EB43C7284367}" destId="{F2FC5465-A93F-AE48-9FD7-1B4F1D1C58B6}" srcOrd="0" destOrd="0" presId="urn:microsoft.com/office/officeart/2005/8/layout/process2"/>
     <dgm:cxn modelId="{2BE550B9-1042-7C48-B40E-B4AEA6C1660A}" srcId="{0DCB4A18-FB49-9845-AA38-8E241C57671C}" destId="{6248A5C6-5978-AE4C-8C31-9A55C671BB49}" srcOrd="1" destOrd="0" parTransId="{82F76170-0DA4-2840-B8E2-9FBD6CA23FAB}" sibTransId="{93B6A063-AF74-664D-AC1C-E9EB84576E5F}"/>
-    <dgm:cxn modelId="{4E5D93AF-750B-CE4F-879F-463125461F3E}" type="presOf" srcId="{237EA267-F0D2-7C4A-98D5-5B9A93060687}" destId="{D82149D3-DCE1-6048-92F3-B68BEF2F4DC8}" srcOrd="1" destOrd="0" presId="urn:microsoft.com/office/officeart/2005/8/layout/process2"/>
-    <dgm:cxn modelId="{633FD542-7404-A549-AA02-ADAAF48A4076}" type="presOf" srcId="{27832FA6-9C94-2A41-895B-C4EAA56D2F59}" destId="{43A4F83B-A2AD-7A47-8114-082A5FCEC3F3}" srcOrd="0" destOrd="0" presId="urn:microsoft.com/office/officeart/2005/8/layout/process2"/>
-    <dgm:cxn modelId="{1F3C400C-390A-7342-8732-AB1B8F297DAD}" type="presOf" srcId="{2298196B-8AE4-254F-AD53-31C9AD9A1264}" destId="{192C57F4-BE5A-7C4C-848A-DD5C92C4E7F7}" srcOrd="0" destOrd="0" presId="urn:microsoft.com/office/officeart/2005/8/layout/process2"/>
-    <dgm:cxn modelId="{DB220F54-6375-5148-A65E-C3DA545B8D25}" type="presOf" srcId="{237EA267-F0D2-7C4A-98D5-5B9A93060687}" destId="{2842B14E-DEFA-F642-8F28-EE7B257635E1}" srcOrd="0" destOrd="0" presId="urn:microsoft.com/office/officeart/2005/8/layout/process2"/>
-    <dgm:cxn modelId="{422E965C-7E4D-2F4A-988B-6DCA0709418F}" type="presOf" srcId="{0DCB4A18-FB49-9845-AA38-8E241C57671C}" destId="{2ABE82A2-941C-4646-B126-163D275D3D67}" srcOrd="0" destOrd="0" presId="urn:microsoft.com/office/officeart/2005/8/layout/process2"/>
+    <dgm:cxn modelId="{0D6036A7-BE65-454B-9852-B2BEE9E1433C}" type="presOf" srcId="{93B6A063-AF74-664D-AC1C-E9EB84576E5F}" destId="{37E2712F-E6A6-BC41-9A2B-F8EF1CE3F485}" srcOrd="0" destOrd="0" presId="urn:microsoft.com/office/officeart/2005/8/layout/process2"/>
+    <dgm:cxn modelId="{285FBB8A-0A29-4941-B944-645E0D3F041A}" type="presOf" srcId="{6248A5C6-5978-AE4C-8C31-9A55C671BB49}" destId="{55F2D839-A9DA-5B42-9FF5-156747F49F4D}" srcOrd="0" destOrd="0" presId="urn:microsoft.com/office/officeart/2005/8/layout/process2"/>
     <dgm:cxn modelId="{A00F5287-14AA-5D4F-872C-CBB38A075A32}" type="presOf" srcId="{DD8E3127-28D4-314E-903E-AFB08B3D104B}" destId="{6BF343B4-FB55-A54A-B361-01FD3D11F415}" srcOrd="0" destOrd="0" presId="urn:microsoft.com/office/officeart/2005/8/layout/process2"/>
-    <dgm:cxn modelId="{285FBB8A-0A29-4941-B944-645E0D3F041A}" type="presOf" srcId="{6248A5C6-5978-AE4C-8C31-9A55C671BB49}" destId="{55F2D839-A9DA-5B42-9FF5-156747F49F4D}" srcOrd="0" destOrd="0" presId="urn:microsoft.com/office/officeart/2005/8/layout/process2"/>
-    <dgm:cxn modelId="{0D6036A7-BE65-454B-9852-B2BEE9E1433C}" type="presOf" srcId="{93B6A063-AF74-664D-AC1C-E9EB84576E5F}" destId="{37E2712F-E6A6-BC41-9A2B-F8EF1CE3F485}" srcOrd="0" destOrd="0" presId="urn:microsoft.com/office/officeart/2005/8/layout/process2"/>
     <dgm:cxn modelId="{83189555-6A3B-7645-8FFB-18583866E3A7}" type="presParOf" srcId="{2ABE82A2-941C-4646-B126-163D275D3D67}" destId="{43A4F83B-A2AD-7A47-8114-082A5FCEC3F3}" srcOrd="0" destOrd="0" presId="urn:microsoft.com/office/officeart/2005/8/layout/process2"/>
     <dgm:cxn modelId="{B7CB5FD6-B2B6-ED46-9B8A-25757EBE6914}" type="presParOf" srcId="{2ABE82A2-941C-4646-B126-163D275D3D67}" destId="{192C57F4-BE5A-7C4C-848A-DD5C92C4E7F7}" srcOrd="1" destOrd="0" presId="urn:microsoft.com/office/officeart/2005/8/layout/process2"/>
     <dgm:cxn modelId="{B147C303-5F79-CA4D-9275-2DFE15C5D848}" type="presParOf" srcId="{192C57F4-BE5A-7C4C-848A-DD5C92C4E7F7}" destId="{67BCB111-C0EB-DC49-9B1D-0BA09630885E}" srcOrd="0" destOrd="0" presId="urn:microsoft.com/office/officeart/2005/8/layout/process2"/>
@@ -3618,7 +3718,7 @@
           <a:p>
             <a:fld id="{BD945FC7-2D69-AF4C-B0EF-7FF789526A7F}" type="datetimeFigureOut">
               <a:rPr lang="en-US" smtClean="0"/>
-              <a:t>12/13/17</a:t>
+              <a:t>12/14/17</a:t>
             </a:fld>
             <a:endParaRPr lang="en-US"/>
           </a:p>
@@ -4017,7 +4117,7 @@
           <a:p>
             <a:fld id="{10FE5BFE-EBFF-4D6E-8C56-06511E61A9FB}" type="datetimeFigureOut">
               <a:rPr lang="pt-BR" smtClean="0"/>
-              <a:t>13/12/2017</a:t>
+              <a:t>14/12/2017</a:t>
             </a:fld>
             <a:endParaRPr lang="pt-BR"/>
           </a:p>
@@ -4187,7 +4287,7 @@
           <a:p>
             <a:fld id="{10FE5BFE-EBFF-4D6E-8C56-06511E61A9FB}" type="datetimeFigureOut">
               <a:rPr lang="pt-BR" smtClean="0"/>
-              <a:t>13/12/2017</a:t>
+              <a:t>14/12/2017</a:t>
             </a:fld>
             <a:endParaRPr lang="pt-BR"/>
           </a:p>
@@ -4367,7 +4467,7 @@
           <a:p>
             <a:fld id="{10FE5BFE-EBFF-4D6E-8C56-06511E61A9FB}" type="datetimeFigureOut">
               <a:rPr lang="pt-BR" smtClean="0"/>
-              <a:t>13/12/2017</a:t>
+              <a:t>14/12/2017</a:t>
             </a:fld>
             <a:endParaRPr lang="pt-BR"/>
           </a:p>
@@ -4537,7 +4637,7 @@
           <a:p>
             <a:fld id="{10FE5BFE-EBFF-4D6E-8C56-06511E61A9FB}" type="datetimeFigureOut">
               <a:rPr lang="pt-BR" smtClean="0"/>
-              <a:t>13/12/2017</a:t>
+              <a:t>14/12/2017</a:t>
             </a:fld>
             <a:endParaRPr lang="pt-BR"/>
           </a:p>
@@ -4781,7 +4881,7 @@
           <a:p>
             <a:fld id="{10FE5BFE-EBFF-4D6E-8C56-06511E61A9FB}" type="datetimeFigureOut">
               <a:rPr lang="pt-BR" smtClean="0"/>
-              <a:t>13/12/2017</a:t>
+              <a:t>14/12/2017</a:t>
             </a:fld>
             <a:endParaRPr lang="pt-BR"/>
           </a:p>
@@ -5013,7 +5113,7 @@
           <a:p>
             <a:fld id="{10FE5BFE-EBFF-4D6E-8C56-06511E61A9FB}" type="datetimeFigureOut">
               <a:rPr lang="pt-BR" smtClean="0"/>
-              <a:t>13/12/2017</a:t>
+              <a:t>14/12/2017</a:t>
             </a:fld>
             <a:endParaRPr lang="pt-BR"/>
           </a:p>
@@ -5380,7 +5480,7 @@
           <a:p>
             <a:fld id="{10FE5BFE-EBFF-4D6E-8C56-06511E61A9FB}" type="datetimeFigureOut">
               <a:rPr lang="pt-BR" smtClean="0"/>
-              <a:t>13/12/2017</a:t>
+              <a:t>14/12/2017</a:t>
             </a:fld>
             <a:endParaRPr lang="pt-BR"/>
           </a:p>
@@ -5498,7 +5598,7 @@
           <a:p>
             <a:fld id="{10FE5BFE-EBFF-4D6E-8C56-06511E61A9FB}" type="datetimeFigureOut">
               <a:rPr lang="pt-BR" smtClean="0"/>
-              <a:t>13/12/2017</a:t>
+              <a:t>14/12/2017</a:t>
             </a:fld>
             <a:endParaRPr lang="pt-BR"/>
           </a:p>
@@ -5593,7 +5693,7 @@
           <a:p>
             <a:fld id="{10FE5BFE-EBFF-4D6E-8C56-06511E61A9FB}" type="datetimeFigureOut">
               <a:rPr lang="pt-BR" smtClean="0"/>
-              <a:t>13/12/2017</a:t>
+              <a:t>14/12/2017</a:t>
             </a:fld>
             <a:endParaRPr lang="pt-BR"/>
           </a:p>
@@ -5870,7 +5970,7 @@
           <a:p>
             <a:fld id="{10FE5BFE-EBFF-4D6E-8C56-06511E61A9FB}" type="datetimeFigureOut">
               <a:rPr lang="pt-BR" smtClean="0"/>
-              <a:t>13/12/2017</a:t>
+              <a:t>14/12/2017</a:t>
             </a:fld>
             <a:endParaRPr lang="pt-BR"/>
           </a:p>
@@ -6127,7 +6227,7 @@
           <a:p>
             <a:fld id="{10FE5BFE-EBFF-4D6E-8C56-06511E61A9FB}" type="datetimeFigureOut">
               <a:rPr lang="pt-BR" smtClean="0"/>
-              <a:t>13/12/2017</a:t>
+              <a:t>14/12/2017</a:t>
             </a:fld>
             <a:endParaRPr lang="pt-BR"/>
           </a:p>
@@ -6349,7 +6449,7 @@
           <a:p>
             <a:fld id="{10FE5BFE-EBFF-4D6E-8C56-06511E61A9FB}" type="datetimeFigureOut">
               <a:rPr lang="pt-BR" smtClean="0"/>
-              <a:t>13/12/2017</a:t>
+              <a:t>14/12/2017</a:t>
             </a:fld>
             <a:endParaRPr lang="pt-BR"/>
           </a:p>
@@ -6843,6 +6943,1410 @@
 </p:sld>
 </file>
 
+<file path=ppt/slides/slide10.xml><?xml version="1.0" encoding="utf-8"?>
+<p:sld xmlns:a="http://schemas.openxmlformats.org/drawingml/2006/main" xmlns:r="http://schemas.openxmlformats.org/officeDocument/2006/relationships" xmlns:p="http://schemas.openxmlformats.org/presentationml/2006/main">
+  <p:cSld>
+    <p:spTree>
+      <p:nvGrpSpPr>
+        <p:cNvPr id="1" name=""/>
+        <p:cNvGrpSpPr/>
+        <p:nvPr/>
+      </p:nvGrpSpPr>
+      <p:grpSpPr>
+        <a:xfrm>
+          <a:off x="0" y="0"/>
+          <a:ext cx="0" cy="0"/>
+          <a:chOff x="0" y="0"/>
+          <a:chExt cx="0" cy="0"/>
+        </a:xfrm>
+      </p:grpSpPr>
+      <p:sp>
+        <p:nvSpPr>
+          <p:cNvPr id="2" name="Title 1"/>
+          <p:cNvSpPr>
+            <a:spLocks noGrp="1"/>
+          </p:cNvSpPr>
+          <p:nvPr>
+            <p:ph type="title"/>
+          </p:nvPr>
+        </p:nvSpPr>
+        <p:spPr/>
+        <p:txBody>
+          <a:bodyPr/>
+          <a:lstStyle/>
+          <a:p>
+            <a:r>
+              <a:rPr lang="en-US" dirty="0" smtClean="0"/>
+              <a:t>PCA + </a:t>
+            </a:r>
+            <a:r>
+              <a:rPr lang="en-US" dirty="0" err="1" smtClean="0"/>
+              <a:t>Normalização</a:t>
+            </a:r>
+            <a:endParaRPr lang="en-US" dirty="0"/>
+          </a:p>
+        </p:txBody>
+      </p:sp>
+      <p:sp>
+        <p:nvSpPr>
+          <p:cNvPr id="3" name="Content Placeholder 2"/>
+          <p:cNvSpPr>
+            <a:spLocks noGrp="1"/>
+          </p:cNvSpPr>
+          <p:nvPr>
+            <p:ph idx="1"/>
+          </p:nvPr>
+        </p:nvSpPr>
+        <p:spPr/>
+        <p:txBody>
+          <a:bodyPr/>
+          <a:lstStyle/>
+          <a:p>
+            <a:r>
+              <a:rPr lang="en-US" dirty="0" err="1" smtClean="0"/>
+              <a:t>Scikit</a:t>
+            </a:r>
+            <a:r>
+              <a:rPr lang="en-US" dirty="0" smtClean="0"/>
+              <a:t>-Learn</a:t>
+            </a:r>
+          </a:p>
+          <a:p>
+            <a:endParaRPr lang="en-US" dirty="0"/>
+          </a:p>
+        </p:txBody>
+      </p:sp>
+      <p:pic>
+        <p:nvPicPr>
+          <p:cNvPr id="7" name="Picture 6"/>
+          <p:cNvPicPr>
+            <a:picLocks noChangeAspect="1"/>
+          </p:cNvPicPr>
+          <p:nvPr/>
+        </p:nvPicPr>
+        <p:blipFill>
+          <a:blip r:embed="rId2">
+            <a:extLst>
+              <a:ext uri="{28A0092B-C50C-407E-A947-70E740481C1C}">
+                <a14:useLocalDpi xmlns:a14="http://schemas.microsoft.com/office/drawing/2010/main" val="0"/>
+              </a:ext>
+            </a:extLst>
+          </a:blip>
+          <a:stretch>
+            <a:fillRect/>
+          </a:stretch>
+        </p:blipFill>
+        <p:spPr>
+          <a:xfrm>
+            <a:off x="0" y="2515237"/>
+            <a:ext cx="9144000" cy="2618807"/>
+          </a:xfrm>
+          <a:prstGeom prst="rect">
+            <a:avLst/>
+          </a:prstGeom>
+        </p:spPr>
+      </p:pic>
+    </p:spTree>
+    <p:extLst>
+      <p:ext uri="{BB962C8B-B14F-4D97-AF65-F5344CB8AC3E}">
+        <p14:creationId xmlns:p14="http://schemas.microsoft.com/office/powerpoint/2010/main" val="2108848012"/>
+      </p:ext>
+    </p:extLst>
+  </p:cSld>
+  <p:clrMapOvr>
+    <a:masterClrMapping/>
+  </p:clrMapOvr>
+</p:sld>
+</file>
+
+<file path=ppt/slides/slide11.xml><?xml version="1.0" encoding="utf-8"?>
+<p:sld xmlns:a="http://schemas.openxmlformats.org/drawingml/2006/main" xmlns:r="http://schemas.openxmlformats.org/officeDocument/2006/relationships" xmlns:p="http://schemas.openxmlformats.org/presentationml/2006/main">
+  <p:cSld>
+    <p:spTree>
+      <p:nvGrpSpPr>
+        <p:cNvPr id="1" name=""/>
+        <p:cNvGrpSpPr/>
+        <p:nvPr/>
+      </p:nvGrpSpPr>
+      <p:grpSpPr>
+        <a:xfrm>
+          <a:off x="0" y="0"/>
+          <a:ext cx="0" cy="0"/>
+          <a:chOff x="0" y="0"/>
+          <a:chExt cx="0" cy="0"/>
+        </a:xfrm>
+      </p:grpSpPr>
+      <p:sp>
+        <p:nvSpPr>
+          <p:cNvPr id="2" name="Title 1"/>
+          <p:cNvSpPr>
+            <a:spLocks noGrp="1"/>
+          </p:cNvSpPr>
+          <p:nvPr>
+            <p:ph type="title"/>
+          </p:nvPr>
+        </p:nvSpPr>
+        <p:spPr/>
+        <p:txBody>
+          <a:bodyPr/>
+          <a:lstStyle/>
+          <a:p>
+            <a:r>
+              <a:rPr lang="en-US" dirty="0" smtClean="0"/>
+              <a:t>Wang-Mendel</a:t>
+            </a:r>
+            <a:endParaRPr lang="en-US" dirty="0"/>
+          </a:p>
+        </p:txBody>
+      </p:sp>
+      <p:sp>
+        <p:nvSpPr>
+          <p:cNvPr id="9" name="TextBox 8"/>
+          <p:cNvSpPr txBox="1"/>
+          <p:nvPr/>
+        </p:nvSpPr>
+        <p:spPr>
+          <a:xfrm>
+            <a:off x="266217" y="1516284"/>
+            <a:ext cx="8704163" cy="4278094"/>
+          </a:xfrm>
+          <a:prstGeom prst="rect">
+            <a:avLst/>
+          </a:prstGeom>
+          <a:noFill/>
+        </p:spPr>
+        <p:txBody>
+          <a:bodyPr wrap="square" rtlCol="0">
+            <a:spAutoFit/>
+          </a:bodyPr>
+          <a:lstStyle/>
+          <a:p>
+            <a:r>
+              <a:rPr lang="en-US" sz="1600" dirty="0"/>
+              <a:t>Para a </a:t>
+            </a:r>
+            <a:r>
+              <a:rPr lang="en-US" sz="1600" dirty="0" err="1"/>
+              <a:t>geração</a:t>
+            </a:r>
+            <a:r>
+              <a:rPr lang="en-US" sz="1600" dirty="0"/>
+              <a:t> das </a:t>
+            </a:r>
+            <a:r>
+              <a:rPr lang="en-US" sz="1600" dirty="0" err="1" smtClean="0"/>
+              <a:t>regras</a:t>
+            </a:r>
+            <a:r>
+              <a:rPr lang="en-US" sz="1600" dirty="0" smtClean="0"/>
+              <a:t>:</a:t>
+            </a:r>
+          </a:p>
+          <a:p>
+            <a:pPr marL="342900" indent="-342900">
+              <a:buFont typeface="+mj-lt"/>
+              <a:buAutoNum type="arabicPeriod"/>
+            </a:pPr>
+            <a:r>
+              <a:rPr lang="en-US" sz="1600" dirty="0" err="1" smtClean="0"/>
+              <a:t>iterou</a:t>
+            </a:r>
+            <a:r>
+              <a:rPr lang="en-US" sz="1600" dirty="0" smtClean="0"/>
+              <a:t>-se </a:t>
+            </a:r>
+            <a:r>
+              <a:rPr lang="en-US" sz="1600" dirty="0" err="1"/>
+              <a:t>sobre</a:t>
+            </a:r>
+            <a:r>
+              <a:rPr lang="en-US" sz="1600" dirty="0"/>
+              <a:t> </a:t>
+            </a:r>
+            <a:r>
+              <a:rPr lang="en-US" sz="1600" dirty="0" err="1"/>
+              <a:t>cada</a:t>
+            </a:r>
+            <a:r>
+              <a:rPr lang="en-US" sz="1600" dirty="0"/>
+              <a:t> um das entradas de </a:t>
+            </a:r>
+            <a:r>
+              <a:rPr lang="en-US" sz="1600" dirty="0" err="1"/>
+              <a:t>treinamento</a:t>
+            </a:r>
+            <a:r>
+              <a:rPr lang="en-US" sz="1600" dirty="0"/>
+              <a:t> e para </a:t>
+            </a:r>
+            <a:r>
+              <a:rPr lang="en-US" sz="1600" dirty="0" err="1"/>
+              <a:t>cada</a:t>
+            </a:r>
+            <a:r>
+              <a:rPr lang="en-US" sz="1600" dirty="0"/>
+              <a:t> </a:t>
+            </a:r>
+            <a:r>
+              <a:rPr lang="en-US" sz="1600" dirty="0" err="1"/>
+              <a:t>variável</a:t>
+            </a:r>
+            <a:r>
+              <a:rPr lang="en-US" sz="1600" dirty="0"/>
+              <a:t> de entrada </a:t>
+            </a:r>
+            <a:r>
+              <a:rPr lang="en-US" sz="1600" dirty="0" err="1"/>
+              <a:t>calculou</a:t>
+            </a:r>
+            <a:r>
+              <a:rPr lang="en-US" sz="1600" dirty="0"/>
+              <a:t>-se a </a:t>
+            </a:r>
+            <a:r>
+              <a:rPr lang="en-US" sz="1600" dirty="0" err="1"/>
+              <a:t>ativação</a:t>
+            </a:r>
+            <a:r>
+              <a:rPr lang="en-US" sz="1600" dirty="0"/>
+              <a:t> </a:t>
+            </a:r>
+            <a:r>
+              <a:rPr lang="en-US" sz="1600" dirty="0" err="1"/>
+              <a:t>nos</a:t>
+            </a:r>
+            <a:r>
+              <a:rPr lang="en-US" sz="1600" dirty="0"/>
+              <a:t> </a:t>
+            </a:r>
+            <a:r>
+              <a:rPr lang="en-US" sz="1600" dirty="0" err="1"/>
+              <a:t>conjuntos</a:t>
+            </a:r>
+            <a:r>
+              <a:rPr lang="en-US" sz="1600" dirty="0"/>
+              <a:t> fuzzy </a:t>
+            </a:r>
+            <a:r>
+              <a:rPr lang="en-US" sz="1600" dirty="0" err="1"/>
+              <a:t>pertinentes</a:t>
+            </a:r>
+            <a:r>
+              <a:rPr lang="en-US" sz="1600" dirty="0" smtClean="0"/>
+              <a:t>.</a:t>
+            </a:r>
+          </a:p>
+          <a:p>
+            <a:pPr marL="342900" indent="-342900">
+              <a:buFont typeface="+mj-lt"/>
+              <a:buAutoNum type="arabicPeriod"/>
+            </a:pPr>
+            <a:r>
+              <a:rPr lang="en-US" sz="1600" dirty="0" smtClean="0"/>
+              <a:t>para </a:t>
+            </a:r>
+            <a:r>
+              <a:rPr lang="en-US" sz="1600" dirty="0" err="1"/>
+              <a:t>cada</a:t>
+            </a:r>
+            <a:r>
+              <a:rPr lang="en-US" sz="1600" dirty="0"/>
+              <a:t> </a:t>
+            </a:r>
+            <a:r>
+              <a:rPr lang="en-US" sz="1600" dirty="0" err="1"/>
+              <a:t>variável</a:t>
+            </a:r>
+            <a:r>
+              <a:rPr lang="en-US" sz="1600" dirty="0"/>
+              <a:t> </a:t>
+            </a:r>
+            <a:r>
+              <a:rPr lang="en-US" sz="1600" dirty="0" err="1"/>
+              <a:t>pegou</a:t>
+            </a:r>
+            <a:r>
+              <a:rPr lang="en-US" sz="1600" dirty="0"/>
+              <a:t>-se o valor </a:t>
+            </a:r>
+            <a:r>
+              <a:rPr lang="en-US" sz="1600" dirty="0" err="1"/>
+              <a:t>máximo</a:t>
+            </a:r>
+            <a:r>
+              <a:rPr lang="en-US" sz="1600" dirty="0"/>
+              <a:t> de </a:t>
+            </a:r>
+            <a:r>
+              <a:rPr lang="en-US" sz="1600" dirty="0" err="1"/>
+              <a:t>ativação</a:t>
+            </a:r>
+            <a:r>
+              <a:rPr lang="en-US" sz="1600" dirty="0"/>
+              <a:t> e o </a:t>
+            </a:r>
+            <a:r>
+              <a:rPr lang="en-US" sz="1600" dirty="0" err="1"/>
+              <a:t>nome</a:t>
+            </a:r>
+            <a:r>
+              <a:rPr lang="en-US" sz="1600" dirty="0"/>
+              <a:t> do </a:t>
+            </a:r>
+            <a:r>
+              <a:rPr lang="en-US" sz="1600" dirty="0" err="1"/>
+              <a:t>conjunto</a:t>
+            </a:r>
+            <a:r>
+              <a:rPr lang="en-US" sz="1600" dirty="0"/>
+              <a:t> </a:t>
+            </a:r>
+            <a:r>
+              <a:rPr lang="en-US" sz="1600" dirty="0" err="1" smtClean="0"/>
+              <a:t>ativado</a:t>
+            </a:r>
+            <a:endParaRPr lang="en-US" sz="1600" dirty="0" smtClean="0"/>
+          </a:p>
+          <a:p>
+            <a:pPr marL="342900" indent="-342900">
+              <a:buFont typeface="+mj-lt"/>
+              <a:buAutoNum type="arabicPeriod"/>
+            </a:pPr>
+            <a:r>
+              <a:rPr lang="en-US" sz="1600" dirty="0" smtClean="0"/>
+              <a:t>com </a:t>
+            </a:r>
+            <a:r>
+              <a:rPr lang="en-US" sz="1600" dirty="0" err="1"/>
+              <a:t>os</a:t>
+            </a:r>
+            <a:r>
+              <a:rPr lang="en-US" sz="1600" dirty="0"/>
+              <a:t> </a:t>
+            </a:r>
+            <a:r>
+              <a:rPr lang="en-US" sz="1600" dirty="0" err="1"/>
+              <a:t>nomes</a:t>
+            </a:r>
+            <a:r>
+              <a:rPr lang="en-US" sz="1600" dirty="0"/>
+              <a:t>, </a:t>
+            </a:r>
+            <a:r>
+              <a:rPr lang="en-US" sz="1600" dirty="0" err="1"/>
+              <a:t>montou</a:t>
+            </a:r>
+            <a:r>
+              <a:rPr lang="en-US" sz="1600" dirty="0"/>
+              <a:t>-se </a:t>
+            </a:r>
+            <a:r>
+              <a:rPr lang="en-US" sz="1600" dirty="0" err="1"/>
+              <a:t>uma</a:t>
+            </a:r>
+            <a:r>
+              <a:rPr lang="en-US" sz="1600" dirty="0"/>
+              <a:t> </a:t>
+            </a:r>
+            <a:r>
+              <a:rPr lang="en-US" sz="1600" dirty="0" err="1"/>
+              <a:t>regra</a:t>
+            </a:r>
+            <a:r>
+              <a:rPr lang="en-US" sz="1600" dirty="0"/>
+              <a:t> do </a:t>
+            </a:r>
+            <a:r>
+              <a:rPr lang="en-US" sz="1600" dirty="0" err="1"/>
+              <a:t>tipo</a:t>
+            </a:r>
+            <a:r>
+              <a:rPr lang="en-US" sz="1600" dirty="0"/>
+              <a:t>: </a:t>
+            </a:r>
+            <a:r>
+              <a:rPr lang="en-US" sz="1600" dirty="0" smtClean="0"/>
+              <a:t/>
+            </a:r>
+            <a:br>
+              <a:rPr lang="en-US" sz="1600" dirty="0" smtClean="0"/>
+            </a:br>
+            <a:r>
+              <a:rPr lang="en-US" sz="1600" dirty="0" smtClean="0"/>
+              <a:t>Se </a:t>
+            </a:r>
+            <a:r>
+              <a:rPr lang="en-US" sz="1600" dirty="0"/>
+              <a:t>VAR1 </a:t>
+            </a:r>
+            <a:r>
+              <a:rPr lang="en-US" sz="1600" dirty="0" err="1"/>
+              <a:t>é</a:t>
+            </a:r>
+            <a:r>
+              <a:rPr lang="en-US" sz="1600" dirty="0"/>
+              <a:t> </a:t>
+            </a:r>
+            <a:r>
+              <a:rPr lang="en-US" sz="1600" dirty="0" err="1"/>
+              <a:t>Média</a:t>
+            </a:r>
+            <a:r>
+              <a:rPr lang="en-US" sz="1600" dirty="0"/>
+              <a:t> E </a:t>
+            </a:r>
+            <a:r>
+              <a:rPr lang="en-US" sz="1600" dirty="0" smtClean="0"/>
+              <a:t/>
+            </a:r>
+            <a:br>
+              <a:rPr lang="en-US" sz="1600" dirty="0" smtClean="0"/>
+            </a:br>
+            <a:r>
+              <a:rPr lang="en-US" sz="1600" dirty="0" smtClean="0"/>
+              <a:t>     VAR2 </a:t>
+            </a:r>
+            <a:r>
+              <a:rPr lang="en-US" sz="1600" dirty="0" err="1"/>
+              <a:t>é</a:t>
+            </a:r>
+            <a:r>
+              <a:rPr lang="en-US" sz="1600" dirty="0"/>
+              <a:t> </a:t>
+            </a:r>
+            <a:r>
+              <a:rPr lang="en-US" sz="1600" dirty="0" err="1"/>
+              <a:t>Média</a:t>
+            </a:r>
+            <a:r>
+              <a:rPr lang="en-US" sz="1600" dirty="0"/>
+              <a:t> Alta E </a:t>
+            </a:r>
+            <a:r>
+              <a:rPr lang="en-US" sz="1600" dirty="0" smtClean="0"/>
+              <a:t/>
+            </a:r>
+            <a:br>
+              <a:rPr lang="en-US" sz="1600" dirty="0" smtClean="0"/>
+            </a:br>
+            <a:r>
+              <a:rPr lang="en-US" sz="1600" dirty="0" smtClean="0"/>
+              <a:t>     VAR3 </a:t>
+            </a:r>
+            <a:r>
+              <a:rPr lang="en-US" sz="1600" dirty="0" err="1"/>
+              <a:t>é</a:t>
+            </a:r>
+            <a:r>
+              <a:rPr lang="en-US" sz="1600" dirty="0"/>
+              <a:t> </a:t>
+            </a:r>
+            <a:r>
+              <a:rPr lang="en-US" sz="1600" dirty="0" err="1"/>
+              <a:t>Baixa</a:t>
+            </a:r>
+            <a:r>
+              <a:rPr lang="en-US" sz="1600" dirty="0"/>
+              <a:t> E </a:t>
+            </a:r>
+            <a:r>
+              <a:rPr lang="en-US" sz="1600" dirty="0" smtClean="0"/>
+              <a:t/>
+            </a:r>
+            <a:br>
+              <a:rPr lang="en-US" sz="1600" dirty="0" smtClean="0"/>
+            </a:br>
+            <a:r>
+              <a:rPr lang="en-US" sz="1600" dirty="0" smtClean="0"/>
+              <a:t>     VAR4 </a:t>
+            </a:r>
+            <a:r>
+              <a:rPr lang="en-US" sz="1600" dirty="0" err="1"/>
+              <a:t>é</a:t>
+            </a:r>
+            <a:r>
+              <a:rPr lang="en-US" sz="1600" dirty="0"/>
+              <a:t> Alta </a:t>
+            </a:r>
+            <a:r>
+              <a:rPr lang="en-US" sz="1600" dirty="0" smtClean="0"/>
+              <a:t/>
+            </a:r>
+            <a:br>
+              <a:rPr lang="en-US" sz="1600" dirty="0" smtClean="0"/>
+            </a:br>
+            <a:r>
+              <a:rPr lang="en-US" sz="1600" dirty="0" smtClean="0"/>
+              <a:t>     ENTÃO </a:t>
+            </a:r>
+            <a:r>
+              <a:rPr lang="en-US" sz="1600" dirty="0"/>
+              <a:t>LABEL </a:t>
+            </a:r>
+            <a:r>
+              <a:rPr lang="en-US" sz="1600" dirty="0" err="1"/>
+              <a:t>é</a:t>
+            </a:r>
+            <a:r>
+              <a:rPr lang="en-US" sz="1600" dirty="0"/>
+              <a:t> </a:t>
+            </a:r>
+            <a:r>
+              <a:rPr lang="en-US" sz="1600" dirty="0" err="1"/>
+              <a:t>Voz</a:t>
+            </a:r>
+            <a:r>
+              <a:rPr lang="en-US" sz="1600" dirty="0"/>
+              <a:t> </a:t>
+            </a:r>
+            <a:r>
+              <a:rPr lang="en-US" sz="1600" dirty="0" err="1" smtClean="0"/>
+              <a:t>Masculina</a:t>
+            </a:r>
+            <a:endParaRPr lang="en-US" sz="1600" dirty="0" smtClean="0"/>
+          </a:p>
+          <a:p>
+            <a:pPr marL="342900" indent="-342900">
+              <a:buFont typeface="+mj-lt"/>
+              <a:buAutoNum type="arabicPeriod"/>
+            </a:pPr>
+            <a:r>
+              <a:rPr lang="en-US" sz="1600" dirty="0" smtClean="0"/>
+              <a:t>com </a:t>
+            </a:r>
+            <a:r>
+              <a:rPr lang="en-US" sz="1600" dirty="0" err="1"/>
+              <a:t>os</a:t>
+            </a:r>
+            <a:r>
+              <a:rPr lang="en-US" sz="1600" dirty="0"/>
+              <a:t> </a:t>
+            </a:r>
+            <a:r>
+              <a:rPr lang="en-US" sz="1600" dirty="0" err="1"/>
+              <a:t>valores</a:t>
+            </a:r>
+            <a:r>
+              <a:rPr lang="en-US" sz="1600" dirty="0"/>
+              <a:t>, fez-se a </a:t>
+            </a:r>
+            <a:r>
+              <a:rPr lang="en-US" sz="1600" dirty="0" err="1"/>
+              <a:t>multiplicação</a:t>
+            </a:r>
+            <a:r>
+              <a:rPr lang="en-US" sz="1600" dirty="0"/>
+              <a:t>(</a:t>
+            </a:r>
+            <a:r>
+              <a:rPr lang="en-US" sz="1600" dirty="0" err="1"/>
+              <a:t>norma</a:t>
+            </a:r>
+            <a:r>
+              <a:rPr lang="en-US" sz="1600" dirty="0"/>
+              <a:t>-T) deles para </a:t>
+            </a:r>
+            <a:r>
+              <a:rPr lang="en-US" sz="1600" dirty="0" err="1"/>
+              <a:t>definir</a:t>
+            </a:r>
+            <a:r>
+              <a:rPr lang="en-US" sz="1600" dirty="0"/>
+              <a:t> o valor da </a:t>
+            </a:r>
+            <a:r>
+              <a:rPr lang="en-US" sz="1600" dirty="0" err="1"/>
+              <a:t>ativação</a:t>
+            </a:r>
+            <a:r>
+              <a:rPr lang="en-US" sz="1600" dirty="0"/>
+              <a:t> da </a:t>
+            </a:r>
+            <a:r>
+              <a:rPr lang="en-US" sz="1600" dirty="0" err="1" smtClean="0"/>
+              <a:t>regra</a:t>
+            </a:r>
+            <a:endParaRPr lang="en-US" sz="1600" dirty="0" smtClean="0"/>
+          </a:p>
+          <a:p>
+            <a:pPr marL="342900" indent="-342900">
+              <a:buFont typeface="+mj-lt"/>
+              <a:buAutoNum type="arabicPeriod"/>
+            </a:pPr>
+            <a:r>
+              <a:rPr lang="en-US" sz="1600" dirty="0" err="1" smtClean="0"/>
+              <a:t>guarda</a:t>
+            </a:r>
+            <a:r>
+              <a:rPr lang="en-US" sz="1600" dirty="0" smtClean="0"/>
+              <a:t>-se </a:t>
+            </a:r>
+            <a:r>
+              <a:rPr lang="en-US" sz="1600" dirty="0" err="1"/>
+              <a:t>em</a:t>
+            </a:r>
+            <a:r>
+              <a:rPr lang="en-US" sz="1600" dirty="0"/>
+              <a:t> um </a:t>
+            </a:r>
+            <a:r>
+              <a:rPr lang="en-US" sz="1600" dirty="0" err="1"/>
+              <a:t>dicionário</a:t>
+            </a:r>
+            <a:r>
+              <a:rPr lang="en-US" sz="1600" dirty="0"/>
+              <a:t>(</a:t>
+            </a:r>
+            <a:r>
+              <a:rPr lang="en-US" sz="1600" dirty="0" err="1"/>
+              <a:t>mapa</a:t>
+            </a:r>
+            <a:r>
+              <a:rPr lang="en-US" sz="1600" dirty="0"/>
+              <a:t>) a </a:t>
+            </a:r>
+            <a:r>
+              <a:rPr lang="en-US" sz="1600" dirty="0" err="1"/>
+              <a:t>regra</a:t>
+            </a:r>
+            <a:r>
+              <a:rPr lang="en-US" sz="1600" dirty="0"/>
+              <a:t> </a:t>
+            </a:r>
+            <a:r>
+              <a:rPr lang="en-US" sz="1600" dirty="0" err="1"/>
+              <a:t>gerada</a:t>
+            </a:r>
+            <a:r>
+              <a:rPr lang="en-US" sz="1600" dirty="0"/>
+              <a:t> da </a:t>
+            </a:r>
+            <a:r>
+              <a:rPr lang="en-US" sz="1600" dirty="0" err="1"/>
+              <a:t>seguinte</a:t>
+            </a:r>
+            <a:r>
+              <a:rPr lang="en-US" sz="1600" dirty="0"/>
+              <a:t> forma</a:t>
+            </a:r>
+            <a:r>
+              <a:rPr lang="en-US" sz="1600" dirty="0" smtClean="0"/>
+              <a:t>:</a:t>
+            </a:r>
+            <a:br>
+              <a:rPr lang="en-US" sz="1600" dirty="0" smtClean="0"/>
+            </a:br>
+            <a:r>
+              <a:rPr lang="en-US" sz="1600" dirty="0" smtClean="0"/>
+              <a:t>{</a:t>
+            </a:r>
+            <a:br>
+              <a:rPr lang="en-US" sz="1600" dirty="0" smtClean="0"/>
+            </a:br>
+            <a:r>
+              <a:rPr lang="en-US" sz="1600" dirty="0" smtClean="0"/>
+              <a:t>    (</a:t>
+            </a:r>
+            <a:r>
+              <a:rPr lang="en-US" sz="1600" dirty="0"/>
+              <a:t>Media, Media Alta, </a:t>
+            </a:r>
+            <a:r>
+              <a:rPr lang="en-US" sz="1600" dirty="0" err="1"/>
+              <a:t>Baixa</a:t>
+            </a:r>
+            <a:r>
+              <a:rPr lang="en-US" sz="1600" dirty="0"/>
+              <a:t>, Alta): [</a:t>
+            </a:r>
+            <a:r>
+              <a:rPr lang="en-US" sz="1600" dirty="0" err="1"/>
+              <a:t>Voz</a:t>
+            </a:r>
+            <a:r>
+              <a:rPr lang="en-US" sz="1600" dirty="0"/>
+              <a:t> </a:t>
+            </a:r>
+            <a:r>
+              <a:rPr lang="en-US" sz="1600" dirty="0" err="1"/>
+              <a:t>Masculina</a:t>
+            </a:r>
+            <a:r>
+              <a:rPr lang="en-US" sz="1600" dirty="0"/>
+              <a:t>, 0.75</a:t>
+            </a:r>
+            <a:r>
+              <a:rPr lang="en-US" sz="1600" dirty="0" smtClean="0"/>
+              <a:t>]</a:t>
+            </a:r>
+            <a:br>
+              <a:rPr lang="en-US" sz="1600" dirty="0" smtClean="0"/>
+            </a:br>
+            <a:r>
+              <a:rPr lang="en-US" sz="1600" dirty="0" smtClean="0"/>
+              <a:t>}</a:t>
+            </a:r>
+            <a:br>
+              <a:rPr lang="en-US" sz="1600" dirty="0" smtClean="0"/>
+            </a:br>
+            <a:r>
+              <a:rPr lang="en-US" sz="1600" dirty="0" smtClean="0"/>
+              <a:t>O </a:t>
+            </a:r>
+            <a:r>
+              <a:rPr lang="en-US" sz="1600" dirty="0" err="1"/>
+              <a:t>índice</a:t>
+            </a:r>
+            <a:r>
+              <a:rPr lang="en-US" sz="1600" dirty="0"/>
+              <a:t> </a:t>
+            </a:r>
+            <a:r>
+              <a:rPr lang="en-US" sz="1600" dirty="0" err="1"/>
+              <a:t>são</a:t>
+            </a:r>
+            <a:r>
+              <a:rPr lang="en-US" sz="1600" dirty="0"/>
+              <a:t> </a:t>
+            </a:r>
+            <a:r>
+              <a:rPr lang="en-US" sz="1600" dirty="0" err="1"/>
+              <a:t>os</a:t>
+            </a:r>
+            <a:r>
+              <a:rPr lang="en-US" sz="1600" dirty="0"/>
+              <a:t> </a:t>
+            </a:r>
+            <a:r>
+              <a:rPr lang="en-US" sz="1600" dirty="0" err="1"/>
+              <a:t>antecedentes</a:t>
+            </a:r>
+            <a:r>
+              <a:rPr lang="en-US" sz="1600" dirty="0"/>
+              <a:t> e o valor </a:t>
+            </a:r>
+            <a:r>
+              <a:rPr lang="en-US" sz="1600" dirty="0" err="1"/>
+              <a:t>é</a:t>
+            </a:r>
+            <a:r>
+              <a:rPr lang="en-US" sz="1600" dirty="0"/>
+              <a:t> o </a:t>
+            </a:r>
+            <a:r>
+              <a:rPr lang="en-US" sz="1600" dirty="0" err="1"/>
+              <a:t>consequente</a:t>
+            </a:r>
+            <a:r>
+              <a:rPr lang="en-US" sz="1600" dirty="0"/>
+              <a:t> com a </a:t>
+            </a:r>
+            <a:r>
+              <a:rPr lang="en-US" sz="1600" dirty="0" err="1"/>
+              <a:t>ativação</a:t>
+            </a:r>
+            <a:r>
+              <a:rPr lang="en-US" sz="1600" dirty="0"/>
+              <a:t> da </a:t>
+            </a:r>
+            <a:r>
+              <a:rPr lang="en-US" sz="1600" dirty="0" err="1"/>
+              <a:t>regra</a:t>
+            </a:r>
+            <a:r>
+              <a:rPr lang="en-US" sz="1600" dirty="0"/>
+              <a:t>. </a:t>
+            </a:r>
+            <a:r>
+              <a:rPr lang="en-US" sz="1600" dirty="0" smtClean="0"/>
+              <a:t/>
+            </a:r>
+            <a:br>
+              <a:rPr lang="en-US" sz="1600" dirty="0" smtClean="0"/>
+            </a:br>
+            <a:r>
+              <a:rPr lang="en-US" sz="1600" dirty="0" err="1" smtClean="0"/>
+              <a:t>Dessa</a:t>
+            </a:r>
+            <a:r>
+              <a:rPr lang="en-US" sz="1600" dirty="0" smtClean="0"/>
+              <a:t> </a:t>
+            </a:r>
+            <a:r>
+              <a:rPr lang="en-US" sz="1600" dirty="0"/>
+              <a:t>forma </a:t>
+            </a:r>
+            <a:r>
+              <a:rPr lang="en-US" sz="1600" dirty="0" err="1"/>
+              <a:t>facilita</a:t>
+            </a:r>
+            <a:r>
+              <a:rPr lang="en-US" sz="1600" dirty="0"/>
+              <a:t> a </a:t>
+            </a:r>
+            <a:r>
+              <a:rPr lang="en-US" sz="1600" dirty="0" err="1" smtClean="0"/>
+              <a:t>indexação</a:t>
+            </a:r>
+            <a:r>
+              <a:rPr lang="en-US" sz="1600" dirty="0" smtClean="0"/>
+              <a:t>/</a:t>
+            </a:r>
+            <a:r>
+              <a:rPr lang="en-US" sz="1600" dirty="0" err="1" smtClean="0"/>
+              <a:t>duplicação</a:t>
+            </a:r>
+            <a:endParaRPr lang="en-US" sz="1600" dirty="0"/>
+          </a:p>
+        </p:txBody>
+      </p:sp>
+    </p:spTree>
+    <p:extLst>
+      <p:ext uri="{BB962C8B-B14F-4D97-AF65-F5344CB8AC3E}">
+        <p14:creationId xmlns:p14="http://schemas.microsoft.com/office/powerpoint/2010/main" val="1628863281"/>
+      </p:ext>
+    </p:extLst>
+  </p:cSld>
+  <p:clrMapOvr>
+    <a:masterClrMapping/>
+  </p:clrMapOvr>
+</p:sld>
+</file>
+
+<file path=ppt/slides/slide12.xml><?xml version="1.0" encoding="utf-8"?>
+<p:sld xmlns:a="http://schemas.openxmlformats.org/drawingml/2006/main" xmlns:r="http://schemas.openxmlformats.org/officeDocument/2006/relationships" xmlns:p="http://schemas.openxmlformats.org/presentationml/2006/main">
+  <p:cSld>
+    <p:spTree>
+      <p:nvGrpSpPr>
+        <p:cNvPr id="1" name=""/>
+        <p:cNvGrpSpPr/>
+        <p:nvPr/>
+      </p:nvGrpSpPr>
+      <p:grpSpPr>
+        <a:xfrm>
+          <a:off x="0" y="0"/>
+          <a:ext cx="0" cy="0"/>
+          <a:chOff x="0" y="0"/>
+          <a:chExt cx="0" cy="0"/>
+        </a:xfrm>
+      </p:grpSpPr>
+      <p:sp>
+        <p:nvSpPr>
+          <p:cNvPr id="2" name="Title 1"/>
+          <p:cNvSpPr>
+            <a:spLocks noGrp="1"/>
+          </p:cNvSpPr>
+          <p:nvPr>
+            <p:ph type="title"/>
+          </p:nvPr>
+        </p:nvSpPr>
+        <p:spPr/>
+        <p:txBody>
+          <a:bodyPr/>
+          <a:lstStyle/>
+          <a:p>
+            <a:r>
+              <a:rPr lang="en-US" dirty="0" smtClean="0"/>
+              <a:t>Wang-Mendel</a:t>
+            </a:r>
+            <a:endParaRPr lang="en-US" dirty="0"/>
+          </a:p>
+        </p:txBody>
+      </p:sp>
+      <p:pic>
+        <p:nvPicPr>
+          <p:cNvPr id="4" name="Content Placeholder 3"/>
+          <p:cNvPicPr>
+            <a:picLocks noGrp="1" noChangeAspect="1"/>
+          </p:cNvPicPr>
+          <p:nvPr>
+            <p:ph idx="1"/>
+          </p:nvPr>
+        </p:nvPicPr>
+        <p:blipFill>
+          <a:blip r:embed="rId2">
+            <a:extLst>
+              <a:ext uri="{28A0092B-C50C-407E-A947-70E740481C1C}">
+                <a14:useLocalDpi xmlns:a14="http://schemas.microsoft.com/office/drawing/2010/main" val="0"/>
+              </a:ext>
+            </a:extLst>
+          </a:blip>
+          <a:stretch>
+            <a:fillRect/>
+          </a:stretch>
+        </p:blipFill>
+        <p:spPr>
+          <a:xfrm>
+            <a:off x="1635629" y="1459196"/>
+            <a:ext cx="5872741" cy="4351338"/>
+          </a:xfrm>
+          <a:prstGeom prst="rect">
+            <a:avLst/>
+          </a:prstGeom>
+        </p:spPr>
+      </p:pic>
+    </p:spTree>
+    <p:extLst>
+      <p:ext uri="{BB962C8B-B14F-4D97-AF65-F5344CB8AC3E}">
+        <p14:creationId xmlns:p14="http://schemas.microsoft.com/office/powerpoint/2010/main" val="1879838962"/>
+      </p:ext>
+    </p:extLst>
+  </p:cSld>
+  <p:clrMapOvr>
+    <a:masterClrMapping/>
+  </p:clrMapOvr>
+</p:sld>
+</file>
+
+<file path=ppt/slides/slide13.xml><?xml version="1.0" encoding="utf-8"?>
+<p:sld xmlns:a="http://schemas.openxmlformats.org/drawingml/2006/main" xmlns:r="http://schemas.openxmlformats.org/officeDocument/2006/relationships" xmlns:p="http://schemas.openxmlformats.org/presentationml/2006/main">
+  <p:cSld>
+    <p:spTree>
+      <p:nvGrpSpPr>
+        <p:cNvPr id="1" name=""/>
+        <p:cNvGrpSpPr/>
+        <p:nvPr/>
+      </p:nvGrpSpPr>
+      <p:grpSpPr>
+        <a:xfrm>
+          <a:off x="0" y="0"/>
+          <a:ext cx="0" cy="0"/>
+          <a:chOff x="0" y="0"/>
+          <a:chExt cx="0" cy="0"/>
+        </a:xfrm>
+      </p:grpSpPr>
+      <p:sp>
+        <p:nvSpPr>
+          <p:cNvPr id="2" name="Title 1"/>
+          <p:cNvSpPr>
+            <a:spLocks noGrp="1"/>
+          </p:cNvSpPr>
+          <p:nvPr>
+            <p:ph type="title"/>
+          </p:nvPr>
+        </p:nvSpPr>
+        <p:spPr/>
+        <p:txBody>
+          <a:bodyPr/>
+          <a:lstStyle/>
+          <a:p>
+            <a:r>
+              <a:rPr lang="en-US" dirty="0" err="1" smtClean="0"/>
+              <a:t>Inferência</a:t>
+            </a:r>
+            <a:r>
+              <a:rPr lang="en-US" dirty="0" smtClean="0"/>
+              <a:t> Fuzzy</a:t>
+            </a:r>
+            <a:endParaRPr lang="en-US" dirty="0"/>
+          </a:p>
+        </p:txBody>
+      </p:sp>
+      <p:pic>
+        <p:nvPicPr>
+          <p:cNvPr id="4" name="Content Placeholder 3"/>
+          <p:cNvPicPr>
+            <a:picLocks noGrp="1" noChangeAspect="1"/>
+          </p:cNvPicPr>
+          <p:nvPr>
+            <p:ph idx="1"/>
+          </p:nvPr>
+        </p:nvPicPr>
+        <p:blipFill>
+          <a:blip r:embed="rId2"/>
+          <a:stretch>
+            <a:fillRect/>
+          </a:stretch>
+        </p:blipFill>
+        <p:spPr>
+          <a:xfrm>
+            <a:off x="628650" y="1913993"/>
+            <a:ext cx="7886700" cy="3017134"/>
+          </a:xfrm>
+          <a:prstGeom prst="rect">
+            <a:avLst/>
+          </a:prstGeom>
+        </p:spPr>
+      </p:pic>
+    </p:spTree>
+    <p:extLst>
+      <p:ext uri="{BB962C8B-B14F-4D97-AF65-F5344CB8AC3E}">
+        <p14:creationId xmlns:p14="http://schemas.microsoft.com/office/powerpoint/2010/main" val="1271052582"/>
+      </p:ext>
+    </p:extLst>
+  </p:cSld>
+  <p:clrMapOvr>
+    <a:masterClrMapping/>
+  </p:clrMapOvr>
+</p:sld>
+</file>
+
+<file path=ppt/slides/slide14.xml><?xml version="1.0" encoding="utf-8"?>
+<p:sld xmlns:a="http://schemas.openxmlformats.org/drawingml/2006/main" xmlns:r="http://schemas.openxmlformats.org/officeDocument/2006/relationships" xmlns:p="http://schemas.openxmlformats.org/presentationml/2006/main">
+  <p:cSld>
+    <p:spTree>
+      <p:nvGrpSpPr>
+        <p:cNvPr id="1" name=""/>
+        <p:cNvGrpSpPr/>
+        <p:nvPr/>
+      </p:nvGrpSpPr>
+      <p:grpSpPr>
+        <a:xfrm>
+          <a:off x="0" y="0"/>
+          <a:ext cx="0" cy="0"/>
+          <a:chOff x="0" y="0"/>
+          <a:chExt cx="0" cy="0"/>
+        </a:xfrm>
+      </p:grpSpPr>
+      <p:sp>
+        <p:nvSpPr>
+          <p:cNvPr id="2" name="Title 1"/>
+          <p:cNvSpPr>
+            <a:spLocks noGrp="1"/>
+          </p:cNvSpPr>
+          <p:nvPr>
+            <p:ph type="title"/>
+          </p:nvPr>
+        </p:nvSpPr>
+        <p:spPr/>
+        <p:txBody>
+          <a:bodyPr/>
+          <a:lstStyle/>
+          <a:p>
+            <a:r>
+              <a:rPr lang="en-US" dirty="0" smtClean="0"/>
+              <a:t>RESULTADOS</a:t>
+            </a:r>
+            <a:endParaRPr lang="en-US" dirty="0"/>
+          </a:p>
+        </p:txBody>
+      </p:sp>
+      <p:sp>
+        <p:nvSpPr>
+          <p:cNvPr id="3" name="Content Placeholder 2"/>
+          <p:cNvSpPr>
+            <a:spLocks noGrp="1"/>
+          </p:cNvSpPr>
+          <p:nvPr>
+            <p:ph idx="1"/>
+          </p:nvPr>
+        </p:nvSpPr>
+        <p:spPr>
+          <a:xfrm>
+            <a:off x="134914" y="1445188"/>
+            <a:ext cx="4051139" cy="4695404"/>
+          </a:xfrm>
+        </p:spPr>
+        <p:txBody>
+          <a:bodyPr>
+            <a:normAutofit/>
+          </a:bodyPr>
+          <a:lstStyle/>
+          <a:p>
+            <a:r>
+              <a:rPr lang="en-US" sz="2400" b="1" dirty="0" smtClean="0"/>
+              <a:t>CENARIO 1:</a:t>
+            </a:r>
+            <a:r>
+              <a:rPr lang="en-US" sz="2400" dirty="0" smtClean="0"/>
+              <a:t> </a:t>
+            </a:r>
+            <a:r>
+              <a:rPr lang="en-US" sz="2400" dirty="0" err="1" smtClean="0"/>
+              <a:t>sem</a:t>
+            </a:r>
+            <a:r>
+              <a:rPr lang="en-US" sz="2400" dirty="0" smtClean="0"/>
+              <a:t> </a:t>
+            </a:r>
+            <a:r>
+              <a:rPr lang="en-US" sz="2400" dirty="0"/>
+              <a:t>a </a:t>
+            </a:r>
+            <a:r>
+              <a:rPr lang="en-US" sz="2400" dirty="0" err="1"/>
+              <a:t>utilização</a:t>
+            </a:r>
+            <a:r>
+              <a:rPr lang="en-US" sz="2400" dirty="0"/>
+              <a:t> do </a:t>
+            </a:r>
+            <a:r>
+              <a:rPr lang="en-US" sz="2400" dirty="0" smtClean="0"/>
+              <a:t>PCA. 4 </a:t>
+            </a:r>
+            <a:r>
+              <a:rPr lang="en-US" sz="2400" dirty="0" err="1" smtClean="0"/>
+              <a:t>variáveis</a:t>
+            </a:r>
+            <a:endParaRPr lang="en-US" sz="2400" dirty="0" smtClean="0"/>
+          </a:p>
+          <a:p>
+            <a:r>
+              <a:rPr lang="en-US" sz="2400" b="1" dirty="0" smtClean="0"/>
+              <a:t>CENARIO 2: </a:t>
+            </a:r>
+            <a:r>
+              <a:rPr lang="en-US" sz="2400" dirty="0" err="1" smtClean="0"/>
+              <a:t>Utilizando</a:t>
+            </a:r>
+            <a:r>
+              <a:rPr lang="en-US" sz="2400" dirty="0" smtClean="0"/>
+              <a:t> PCA. 3 </a:t>
+            </a:r>
+            <a:r>
+              <a:rPr lang="en-US" sz="2400" dirty="0" err="1" smtClean="0"/>
+              <a:t>Componentes</a:t>
+            </a:r>
+            <a:endParaRPr lang="en-US" sz="2400" dirty="0" smtClean="0"/>
+          </a:p>
+          <a:p>
+            <a:r>
+              <a:rPr lang="en-US" sz="2400" b="1" dirty="0" smtClean="0"/>
+              <a:t>CENARIO 3:</a:t>
+            </a:r>
+            <a:r>
+              <a:rPr lang="en-US" sz="2400" dirty="0" smtClean="0"/>
+              <a:t> </a:t>
+            </a:r>
+            <a:r>
+              <a:rPr lang="en-US" sz="2400" dirty="0" err="1" smtClean="0"/>
+              <a:t>Utilizando</a:t>
+            </a:r>
+            <a:r>
+              <a:rPr lang="en-US" sz="2400" dirty="0" smtClean="0"/>
+              <a:t> PCA. 4 </a:t>
+            </a:r>
+            <a:r>
+              <a:rPr lang="en-US" sz="2400" dirty="0" err="1" smtClean="0"/>
+              <a:t>Componentes</a:t>
+            </a:r>
+            <a:endParaRPr lang="en-US" sz="2400" dirty="0" smtClean="0"/>
+          </a:p>
+          <a:p>
+            <a:r>
+              <a:rPr lang="en-US" sz="2400" b="1" dirty="0" smtClean="0"/>
+              <a:t>CENARIO 4: </a:t>
+            </a:r>
+            <a:r>
+              <a:rPr lang="en-US" sz="2400" dirty="0" err="1" smtClean="0"/>
+              <a:t>Utilizando</a:t>
+            </a:r>
+            <a:r>
+              <a:rPr lang="en-US" sz="2400" dirty="0" smtClean="0"/>
+              <a:t> PCA. 5 </a:t>
+            </a:r>
+            <a:r>
+              <a:rPr lang="en-US" sz="2400" dirty="0" err="1" smtClean="0"/>
+              <a:t>Componentes</a:t>
+            </a:r>
+            <a:endParaRPr lang="en-US" sz="2400" dirty="0" smtClean="0"/>
+          </a:p>
+          <a:p>
+            <a:r>
+              <a:rPr lang="en-US" sz="2400" b="1" dirty="0" smtClean="0"/>
+              <a:t>CENARIO 5: </a:t>
+            </a:r>
+            <a:r>
+              <a:rPr lang="en-US" sz="2400" dirty="0" err="1" smtClean="0"/>
+              <a:t>Utilizando</a:t>
+            </a:r>
+            <a:r>
+              <a:rPr lang="en-US" sz="2400" dirty="0" smtClean="0"/>
+              <a:t> PCA. 10 Components</a:t>
+            </a:r>
+            <a:endParaRPr lang="en-US" sz="2400" dirty="0"/>
+          </a:p>
+        </p:txBody>
+      </p:sp>
+      <p:pic>
+        <p:nvPicPr>
+          <p:cNvPr id="4" name="Picture 3"/>
+          <p:cNvPicPr>
+            <a:picLocks noChangeAspect="1"/>
+          </p:cNvPicPr>
+          <p:nvPr/>
+        </p:nvPicPr>
+        <p:blipFill>
+          <a:blip r:embed="rId2"/>
+          <a:stretch>
+            <a:fillRect/>
+          </a:stretch>
+        </p:blipFill>
+        <p:spPr>
+          <a:xfrm>
+            <a:off x="3946967" y="1445188"/>
+            <a:ext cx="5197033" cy="3572960"/>
+          </a:xfrm>
+          <a:prstGeom prst="rect">
+            <a:avLst/>
+          </a:prstGeom>
+        </p:spPr>
+      </p:pic>
+    </p:spTree>
+    <p:extLst>
+      <p:ext uri="{BB962C8B-B14F-4D97-AF65-F5344CB8AC3E}">
+        <p14:creationId xmlns:p14="http://schemas.microsoft.com/office/powerpoint/2010/main" val="1113260632"/>
+      </p:ext>
+    </p:extLst>
+  </p:cSld>
+  <p:clrMapOvr>
+    <a:masterClrMapping/>
+  </p:clrMapOvr>
+</p:sld>
+</file>
+
+<file path=ppt/slides/slide15.xml><?xml version="1.0" encoding="utf-8"?>
+<p:sld xmlns:a="http://schemas.openxmlformats.org/drawingml/2006/main" xmlns:r="http://schemas.openxmlformats.org/officeDocument/2006/relationships" xmlns:p="http://schemas.openxmlformats.org/presentationml/2006/main">
+  <p:cSld>
+    <p:spTree>
+      <p:nvGrpSpPr>
+        <p:cNvPr id="1" name=""/>
+        <p:cNvGrpSpPr/>
+        <p:nvPr/>
+      </p:nvGrpSpPr>
+      <p:grpSpPr>
+        <a:xfrm>
+          <a:off x="0" y="0"/>
+          <a:ext cx="0" cy="0"/>
+          <a:chOff x="0" y="0"/>
+          <a:chExt cx="0" cy="0"/>
+        </a:xfrm>
+      </p:grpSpPr>
+      <p:sp>
+        <p:nvSpPr>
+          <p:cNvPr id="2" name="Title 1"/>
+          <p:cNvSpPr>
+            <a:spLocks noGrp="1"/>
+          </p:cNvSpPr>
+          <p:nvPr>
+            <p:ph type="title"/>
+          </p:nvPr>
+        </p:nvSpPr>
+        <p:spPr/>
+        <p:txBody>
+          <a:bodyPr/>
+          <a:lstStyle/>
+          <a:p>
+            <a:r>
+              <a:rPr lang="en-US" dirty="0" smtClean="0"/>
+              <a:t>RESULTADOS</a:t>
+            </a:r>
+            <a:endParaRPr lang="en-US" dirty="0"/>
+          </a:p>
+        </p:txBody>
+      </p:sp>
+      <p:pic>
+        <p:nvPicPr>
+          <p:cNvPr id="12" name="Content Placeholder 11"/>
+          <p:cNvPicPr>
+            <a:picLocks noGrp="1" noChangeAspect="1"/>
+          </p:cNvPicPr>
+          <p:nvPr>
+            <p:ph idx="1"/>
+          </p:nvPr>
+        </p:nvPicPr>
+        <p:blipFill>
+          <a:blip r:embed="rId2"/>
+          <a:stretch>
+            <a:fillRect/>
+          </a:stretch>
+        </p:blipFill>
+        <p:spPr>
+          <a:xfrm>
+            <a:off x="628650" y="1898571"/>
+            <a:ext cx="7886700" cy="4205445"/>
+          </a:xfrm>
+          <a:prstGeom prst="rect">
+            <a:avLst/>
+          </a:prstGeom>
+        </p:spPr>
+      </p:pic>
+    </p:spTree>
+    <p:extLst>
+      <p:ext uri="{BB962C8B-B14F-4D97-AF65-F5344CB8AC3E}">
+        <p14:creationId xmlns:p14="http://schemas.microsoft.com/office/powerpoint/2010/main" val="342897125"/>
+      </p:ext>
+    </p:extLst>
+  </p:cSld>
+  <p:clrMapOvr>
+    <a:masterClrMapping/>
+  </p:clrMapOvr>
+</p:sld>
+</file>
+
+<file path=ppt/slides/slide16.xml><?xml version="1.0" encoding="utf-8"?>
+<p:sld xmlns:a="http://schemas.openxmlformats.org/drawingml/2006/main" xmlns:r="http://schemas.openxmlformats.org/officeDocument/2006/relationships" xmlns:p="http://schemas.openxmlformats.org/presentationml/2006/main">
+  <p:cSld>
+    <p:spTree>
+      <p:nvGrpSpPr>
+        <p:cNvPr id="1" name=""/>
+        <p:cNvGrpSpPr/>
+        <p:nvPr/>
+      </p:nvGrpSpPr>
+      <p:grpSpPr>
+        <a:xfrm>
+          <a:off x="0" y="0"/>
+          <a:ext cx="0" cy="0"/>
+          <a:chOff x="0" y="0"/>
+          <a:chExt cx="0" cy="0"/>
+        </a:xfrm>
+      </p:grpSpPr>
+      <p:sp>
+        <p:nvSpPr>
+          <p:cNvPr id="4" name="Title 3"/>
+          <p:cNvSpPr>
+            <a:spLocks noGrp="1"/>
+          </p:cNvSpPr>
+          <p:nvPr>
+            <p:ph type="ctrTitle"/>
+          </p:nvPr>
+        </p:nvSpPr>
+        <p:spPr/>
+        <p:txBody>
+          <a:bodyPr/>
+          <a:lstStyle/>
+          <a:p>
+            <a:r>
+              <a:rPr lang="en-US" smtClean="0"/>
+              <a:t>Obrigado!</a:t>
+            </a:r>
+            <a:endParaRPr lang="en-US"/>
+          </a:p>
+        </p:txBody>
+      </p:sp>
+      <p:sp>
+        <p:nvSpPr>
+          <p:cNvPr id="5" name="Subtitle 4"/>
+          <p:cNvSpPr>
+            <a:spLocks noGrp="1"/>
+          </p:cNvSpPr>
+          <p:nvPr>
+            <p:ph type="subTitle" idx="1"/>
+          </p:nvPr>
+        </p:nvSpPr>
+        <p:spPr/>
+        <p:txBody>
+          <a:bodyPr/>
+          <a:lstStyle/>
+          <a:p>
+            <a:endParaRPr lang="en-US"/>
+          </a:p>
+        </p:txBody>
+      </p:sp>
+    </p:spTree>
+    <p:extLst>
+      <p:ext uri="{BB962C8B-B14F-4D97-AF65-F5344CB8AC3E}">
+        <p14:creationId xmlns:p14="http://schemas.microsoft.com/office/powerpoint/2010/main" val="1103991191"/>
+      </p:ext>
+    </p:extLst>
+  </p:cSld>
+  <p:clrMapOvr>
+    <a:masterClrMapping/>
+  </p:clrMapOvr>
+</p:sld>
+</file>
+
 <file path=ppt/slides/slide2.xml><?xml version="1.0" encoding="utf-8"?>
 <p:sld xmlns:a="http://schemas.openxmlformats.org/drawingml/2006/main" xmlns:r="http://schemas.openxmlformats.org/officeDocument/2006/relationships" xmlns:p="http://schemas.openxmlformats.org/presentationml/2006/main">
   <p:cSld>
@@ -7136,8 +8640,8 @@
           </a:xfrm>
         </p:spPr>
       </p:pic>
-      <mc:AlternateContent xmlns:mc="http://schemas.openxmlformats.org/markup-compatibility/2006">
-        <mc:Choice xmlns:a14="http://schemas.microsoft.com/office/drawing/2010/main" Requires="a14">
+      <mc:AlternateContent xmlns:mc="http://schemas.openxmlformats.org/markup-compatibility/2006" xmlns:a14="http://schemas.microsoft.com/office/drawing/2010/main">
+        <mc:Choice Requires="a14">
           <p:sp>
             <p:nvSpPr>
               <p:cNvPr id="5" name="Espaço Reservado para Conteúdo 2"/>
@@ -7378,7 +8882,6 @@
                 </a:r>
               </a:p>
               <a:p>
-                <a:pPr/>
                 <a14:m>
                   <m:oMath xmlns:m="http://schemas.openxmlformats.org/officeDocument/2006/math">
                     <m:sSubSup>
@@ -7450,7 +8953,6 @@
                 </a:r>
               </a:p>
               <a:p>
-                <a:pPr/>
                 <a14:m>
                   <m:oMath xmlns:m="http://schemas.openxmlformats.org/officeDocument/2006/math">
                     <m:sSup>
@@ -7565,13 +9067,7 @@
                       <a:rPr lang="en-US" b="0" i="1" smtClean="0">
                         <a:latin typeface="Cambria Math" charset="0"/>
                       </a:rPr>
-                      <m:t> </m:t>
-                    </m:r>
-                    <m:r>
-                      <a:rPr lang="en-US" b="0" i="1" smtClean="0">
-                        <a:latin typeface="Cambria Math" charset="0"/>
-                      </a:rPr>
-                      <m:t>é </m:t>
+                      <m:t> é </m:t>
                     </m:r>
                     <m:r>
                       <a:rPr lang="en-US" b="0" i="1" smtClean="0">
@@ -7766,7 +9262,7 @@
             </p:txBody>
           </p:sp>
         </mc:Choice>
-        <mc:Fallback>
+        <mc:Fallback xmlns="">
           <p:sp>
             <p:nvSpPr>
               <p:cNvPr id="5" name="Espaço Reservado para Conteúdo 2"/>
@@ -8365,6 +9861,294 @@
     <p:extLst>
       <p:ext uri="{BB962C8B-B14F-4D97-AF65-F5344CB8AC3E}">
         <p14:creationId xmlns:p14="http://schemas.microsoft.com/office/powerpoint/2010/main" val="1757045738"/>
+      </p:ext>
+    </p:extLst>
+  </p:cSld>
+  <p:clrMapOvr>
+    <a:masterClrMapping/>
+  </p:clrMapOvr>
+</p:sld>
+</file>
+
+<file path=ppt/slides/slide8.xml><?xml version="1.0" encoding="utf-8"?>
+<p:sld xmlns:a="http://schemas.openxmlformats.org/drawingml/2006/main" xmlns:r="http://schemas.openxmlformats.org/officeDocument/2006/relationships" xmlns:p="http://schemas.openxmlformats.org/presentationml/2006/main">
+  <p:cSld>
+    <p:spTree>
+      <p:nvGrpSpPr>
+        <p:cNvPr id="1" name=""/>
+        <p:cNvGrpSpPr/>
+        <p:nvPr/>
+      </p:nvGrpSpPr>
+      <p:grpSpPr>
+        <a:xfrm>
+          <a:off x="0" y="0"/>
+          <a:ext cx="0" cy="0"/>
+          <a:chOff x="0" y="0"/>
+          <a:chExt cx="0" cy="0"/>
+        </a:xfrm>
+      </p:grpSpPr>
+      <p:sp>
+        <p:nvSpPr>
+          <p:cNvPr id="2" name="Title 1"/>
+          <p:cNvSpPr>
+            <a:spLocks noGrp="1"/>
+          </p:cNvSpPr>
+          <p:nvPr>
+            <p:ph type="title"/>
+          </p:nvPr>
+        </p:nvSpPr>
+        <p:spPr/>
+        <p:txBody>
+          <a:bodyPr/>
+          <a:lstStyle/>
+          <a:p>
+            <a:r>
+              <a:rPr lang="en-US" dirty="0" smtClean="0"/>
+              <a:t>IMPLEMENTAÇÃO</a:t>
+            </a:r>
+            <a:endParaRPr lang="en-US" dirty="0"/>
+          </a:p>
+        </p:txBody>
+      </p:sp>
+      <p:pic>
+        <p:nvPicPr>
+          <p:cNvPr id="4" name="Content Placeholder 3"/>
+          <p:cNvPicPr>
+            <a:picLocks noGrp="1" noChangeAspect="1"/>
+          </p:cNvPicPr>
+          <p:nvPr>
+            <p:ph idx="1"/>
+          </p:nvPr>
+        </p:nvPicPr>
+        <p:blipFill>
+          <a:blip r:embed="rId2"/>
+          <a:stretch>
+            <a:fillRect/>
+          </a:stretch>
+        </p:blipFill>
+        <p:spPr>
+          <a:xfrm>
+            <a:off x="946150" y="1972911"/>
+            <a:ext cx="7251700" cy="2806700"/>
+          </a:xfrm>
+          <a:prstGeom prst="rect">
+            <a:avLst/>
+          </a:prstGeom>
+        </p:spPr>
+      </p:pic>
+    </p:spTree>
+    <p:extLst>
+      <p:ext uri="{BB962C8B-B14F-4D97-AF65-F5344CB8AC3E}">
+        <p14:creationId xmlns:p14="http://schemas.microsoft.com/office/powerpoint/2010/main" val="765228317"/>
+      </p:ext>
+    </p:extLst>
+  </p:cSld>
+  <p:clrMapOvr>
+    <a:masterClrMapping/>
+  </p:clrMapOvr>
+</p:sld>
+</file>
+
+<file path=ppt/slides/slide9.xml><?xml version="1.0" encoding="utf-8"?>
+<p:sld xmlns:a="http://schemas.openxmlformats.org/drawingml/2006/main" xmlns:r="http://schemas.openxmlformats.org/officeDocument/2006/relationships" xmlns:p="http://schemas.openxmlformats.org/presentationml/2006/main">
+  <p:cSld>
+    <p:spTree>
+      <p:nvGrpSpPr>
+        <p:cNvPr id="1" name=""/>
+        <p:cNvGrpSpPr/>
+        <p:nvPr/>
+      </p:nvGrpSpPr>
+      <p:grpSpPr>
+        <a:xfrm>
+          <a:off x="0" y="0"/>
+          <a:ext cx="0" cy="0"/>
+          <a:chOff x="0" y="0"/>
+          <a:chExt cx="0" cy="0"/>
+        </a:xfrm>
+      </p:grpSpPr>
+      <p:sp>
+        <p:nvSpPr>
+          <p:cNvPr id="2" name="Title 1"/>
+          <p:cNvSpPr>
+            <a:spLocks noGrp="1"/>
+          </p:cNvSpPr>
+          <p:nvPr>
+            <p:ph type="title"/>
+          </p:nvPr>
+        </p:nvSpPr>
+        <p:spPr/>
+        <p:txBody>
+          <a:bodyPr/>
+          <a:lstStyle/>
+          <a:p>
+            <a:r>
+              <a:rPr lang="en-US" dirty="0" err="1" smtClean="0"/>
+              <a:t>Normalização</a:t>
+            </a:r>
+            <a:r>
+              <a:rPr lang="en-US" dirty="0" smtClean="0"/>
+              <a:t> dos dados</a:t>
+            </a:r>
+            <a:endParaRPr lang="en-US" dirty="0"/>
+          </a:p>
+        </p:txBody>
+      </p:sp>
+      <p:pic>
+        <p:nvPicPr>
+          <p:cNvPr id="5" name="Content Placeholder 4"/>
+          <p:cNvPicPr>
+            <a:picLocks noGrp="1" noChangeAspect="1"/>
+          </p:cNvPicPr>
+          <p:nvPr>
+            <p:ph idx="1"/>
+          </p:nvPr>
+        </p:nvPicPr>
+        <p:blipFill>
+          <a:blip r:embed="rId2">
+            <a:extLst>
+              <a:ext uri="{28A0092B-C50C-407E-A947-70E740481C1C}">
+                <a14:useLocalDpi xmlns:a14="http://schemas.microsoft.com/office/drawing/2010/main" val="0"/>
+              </a:ext>
+            </a:extLst>
+          </a:blip>
+          <a:stretch>
+            <a:fillRect/>
+          </a:stretch>
+        </p:blipFill>
+        <p:spPr>
+          <a:xfrm>
+            <a:off x="740780" y="2811683"/>
+            <a:ext cx="6388100" cy="1701800"/>
+          </a:xfrm>
+        </p:spPr>
+      </p:pic>
+      <p:sp>
+        <p:nvSpPr>
+          <p:cNvPr id="6" name="TextBox 5"/>
+          <p:cNvSpPr txBox="1"/>
+          <p:nvPr/>
+        </p:nvSpPr>
+        <p:spPr>
+          <a:xfrm>
+            <a:off x="740780" y="1690689"/>
+            <a:ext cx="7080272" cy="923330"/>
+          </a:xfrm>
+          <a:prstGeom prst="rect">
+            <a:avLst/>
+          </a:prstGeom>
+          <a:noFill/>
+        </p:spPr>
+        <p:txBody>
+          <a:bodyPr wrap="none" rtlCol="0">
+            <a:spAutoFit/>
+          </a:bodyPr>
+          <a:lstStyle/>
+          <a:p>
+            <a:pPr marL="285750" indent="-285750">
+              <a:buFont typeface="Arial" charset="0"/>
+              <a:buChar char="•"/>
+            </a:pPr>
+            <a:r>
+              <a:rPr lang="en-US" dirty="0" err="1" smtClean="0"/>
+              <a:t>Equalizar</a:t>
+            </a:r>
+            <a:r>
+              <a:rPr lang="en-US" dirty="0" smtClean="0"/>
+              <a:t> </a:t>
+            </a:r>
+            <a:r>
+              <a:rPr lang="en-US" dirty="0" err="1" smtClean="0"/>
+              <a:t>variáveis</a:t>
+            </a:r>
+            <a:r>
+              <a:rPr lang="en-US" dirty="0" smtClean="0"/>
+              <a:t> para que </a:t>
+            </a:r>
+            <a:r>
+              <a:rPr lang="en-US" dirty="0" err="1" smtClean="0"/>
+              <a:t>nenhuma</a:t>
+            </a:r>
+            <a:r>
+              <a:rPr lang="en-US" dirty="0" smtClean="0"/>
+              <a:t> </a:t>
+            </a:r>
+            <a:r>
+              <a:rPr lang="en-US" dirty="0" err="1" smtClean="0"/>
+              <a:t>seja</a:t>
+            </a:r>
+            <a:r>
+              <a:rPr lang="en-US" dirty="0" smtClean="0"/>
+              <a:t> </a:t>
+            </a:r>
+            <a:r>
+              <a:rPr lang="en-US" dirty="0" err="1" smtClean="0"/>
+              <a:t>favorecida</a:t>
+            </a:r>
+            <a:r>
+              <a:rPr lang="en-US" dirty="0" smtClean="0"/>
+              <a:t> no </a:t>
+            </a:r>
+            <a:r>
+              <a:rPr lang="en-US" dirty="0" err="1" smtClean="0"/>
+              <a:t>processo</a:t>
+            </a:r>
+            <a:r>
+              <a:rPr lang="en-US" dirty="0" smtClean="0"/>
+              <a:t> PCA</a:t>
+            </a:r>
+          </a:p>
+          <a:p>
+            <a:pPr marL="285750" indent="-285750">
+              <a:buFont typeface="Arial" charset="0"/>
+              <a:buChar char="•"/>
+            </a:pPr>
+            <a:r>
+              <a:rPr lang="en-US" dirty="0" err="1" smtClean="0"/>
+              <a:t>Coerência</a:t>
+            </a:r>
+            <a:r>
+              <a:rPr lang="en-US" dirty="0" smtClean="0"/>
+              <a:t> </a:t>
+            </a:r>
+            <a:r>
+              <a:rPr lang="en-US" dirty="0" err="1" smtClean="0"/>
+              <a:t>na</a:t>
+            </a:r>
+            <a:r>
+              <a:rPr lang="en-US" dirty="0" smtClean="0"/>
+              <a:t> </a:t>
+            </a:r>
+            <a:r>
+              <a:rPr lang="en-US" dirty="0" err="1" smtClean="0"/>
+              <a:t>covariancia</a:t>
+            </a:r>
+            <a:r>
+              <a:rPr lang="en-US" dirty="0" smtClean="0"/>
+              <a:t> das </a:t>
+            </a:r>
+            <a:r>
+              <a:rPr lang="en-US" dirty="0" err="1" smtClean="0"/>
+              <a:t>variáveis</a:t>
+            </a:r>
+            <a:endParaRPr lang="en-US" dirty="0" smtClean="0"/>
+          </a:p>
+          <a:p>
+            <a:pPr marL="285750" indent="-285750">
+              <a:buFont typeface="Arial" charset="0"/>
+              <a:buChar char="•"/>
+            </a:pPr>
+            <a:r>
+              <a:rPr lang="en-US" dirty="0" err="1" smtClean="0"/>
+              <a:t>ScikitLearn</a:t>
+            </a:r>
+            <a:endParaRPr lang="en-US" dirty="0"/>
+          </a:p>
+        </p:txBody>
+      </p:sp>
+    </p:spTree>
+    <p:extLst>
+      <p:ext uri="{BB962C8B-B14F-4D97-AF65-F5344CB8AC3E}">
+        <p14:creationId xmlns:p14="http://schemas.microsoft.com/office/powerpoint/2010/main" val="2048843935"/>
       </p:ext>
     </p:extLst>
   </p:cSld>

</xml_diff>